<commit_message>
docs(compatibility): 添加 Kylin OS 支持、更新文档
</commit_message>
<xml_diff>
--- a/assets/structure.pptx
+++ b/assets/structure.pptx
@@ -261,7 +261,7 @@
           <a:p>
             <a:fld id="{9B2387BA-B548-4886-B636-448A355EFC24}" type="datetimeFigureOut">
               <a:rPr lang="zh-CN" altLang="en-US" smtClean="0"/>
-              <a:t>2025/7/5</a:t>
+              <a:t>2025/7/15</a:t>
             </a:fld>
             <a:endParaRPr lang="zh-CN" altLang="en-US"/>
           </a:p>
@@ -459,7 +459,7 @@
           <a:p>
             <a:fld id="{9B2387BA-B548-4886-B636-448A355EFC24}" type="datetimeFigureOut">
               <a:rPr lang="zh-CN" altLang="en-US" smtClean="0"/>
-              <a:t>2025/7/5</a:t>
+              <a:t>2025/7/15</a:t>
             </a:fld>
             <a:endParaRPr lang="zh-CN" altLang="en-US"/>
           </a:p>
@@ -667,7 +667,7 @@
           <a:p>
             <a:fld id="{9B2387BA-B548-4886-B636-448A355EFC24}" type="datetimeFigureOut">
               <a:rPr lang="zh-CN" altLang="en-US" smtClean="0"/>
-              <a:t>2025/7/5</a:t>
+              <a:t>2025/7/15</a:t>
             </a:fld>
             <a:endParaRPr lang="zh-CN" altLang="en-US"/>
           </a:p>
@@ -865,7 +865,7 @@
           <a:p>
             <a:fld id="{9B2387BA-B548-4886-B636-448A355EFC24}" type="datetimeFigureOut">
               <a:rPr lang="zh-CN" altLang="en-US" smtClean="0"/>
-              <a:t>2025/7/5</a:t>
+              <a:t>2025/7/15</a:t>
             </a:fld>
             <a:endParaRPr lang="zh-CN" altLang="en-US"/>
           </a:p>
@@ -1140,7 +1140,7 @@
           <a:p>
             <a:fld id="{9B2387BA-B548-4886-B636-448A355EFC24}" type="datetimeFigureOut">
               <a:rPr lang="zh-CN" altLang="en-US" smtClean="0"/>
-              <a:t>2025/7/5</a:t>
+              <a:t>2025/7/15</a:t>
             </a:fld>
             <a:endParaRPr lang="zh-CN" altLang="en-US"/>
           </a:p>
@@ -1405,7 +1405,7 @@
           <a:p>
             <a:fld id="{9B2387BA-B548-4886-B636-448A355EFC24}" type="datetimeFigureOut">
               <a:rPr lang="zh-CN" altLang="en-US" smtClean="0"/>
-              <a:t>2025/7/5</a:t>
+              <a:t>2025/7/15</a:t>
             </a:fld>
             <a:endParaRPr lang="zh-CN" altLang="en-US"/>
           </a:p>
@@ -1817,7 +1817,7 @@
           <a:p>
             <a:fld id="{9B2387BA-B548-4886-B636-448A355EFC24}" type="datetimeFigureOut">
               <a:rPr lang="zh-CN" altLang="en-US" smtClean="0"/>
-              <a:t>2025/7/5</a:t>
+              <a:t>2025/7/15</a:t>
             </a:fld>
             <a:endParaRPr lang="zh-CN" altLang="en-US"/>
           </a:p>
@@ -1958,7 +1958,7 @@
           <a:p>
             <a:fld id="{9B2387BA-B548-4886-B636-448A355EFC24}" type="datetimeFigureOut">
               <a:rPr lang="zh-CN" altLang="en-US" smtClean="0"/>
-              <a:t>2025/7/5</a:t>
+              <a:t>2025/7/15</a:t>
             </a:fld>
             <a:endParaRPr lang="zh-CN" altLang="en-US"/>
           </a:p>
@@ -2071,7 +2071,7 @@
           <a:p>
             <a:fld id="{9B2387BA-B548-4886-B636-448A355EFC24}" type="datetimeFigureOut">
               <a:rPr lang="zh-CN" altLang="en-US" smtClean="0"/>
-              <a:t>2025/7/5</a:t>
+              <a:t>2025/7/15</a:t>
             </a:fld>
             <a:endParaRPr lang="zh-CN" altLang="en-US"/>
           </a:p>
@@ -2382,7 +2382,7 @@
           <a:p>
             <a:fld id="{9B2387BA-B548-4886-B636-448A355EFC24}" type="datetimeFigureOut">
               <a:rPr lang="zh-CN" altLang="en-US" smtClean="0"/>
-              <a:t>2025/7/5</a:t>
+              <a:t>2025/7/15</a:t>
             </a:fld>
             <a:endParaRPr lang="zh-CN" altLang="en-US"/>
           </a:p>
@@ -2670,7 +2670,7 @@
           <a:p>
             <a:fld id="{9B2387BA-B548-4886-B636-448A355EFC24}" type="datetimeFigureOut">
               <a:rPr lang="zh-CN" altLang="en-US" smtClean="0"/>
-              <a:t>2025/7/5</a:t>
+              <a:t>2025/7/15</a:t>
             </a:fld>
             <a:endParaRPr lang="zh-CN" altLang="en-US"/>
           </a:p>
@@ -2911,7 +2911,7 @@
           <a:p>
             <a:fld id="{9B2387BA-B548-4886-B636-448A355EFC24}" type="datetimeFigureOut">
               <a:rPr lang="zh-CN" altLang="en-US" smtClean="0"/>
-              <a:t>2025/7/5</a:t>
+              <a:t>2025/7/15</a:t>
             </a:fld>
             <a:endParaRPr lang="zh-CN" altLang="en-US"/>
           </a:p>
@@ -3314,6 +3314,14 @@
 <file path=ppt/slides/slide1.xml><?xml version="1.0" encoding="utf-8"?>
 <p:sld xmlns:a="http://schemas.openxmlformats.org/drawingml/2006/main" xmlns:r="http://schemas.openxmlformats.org/officeDocument/2006/relationships" xmlns:p="http://schemas.openxmlformats.org/presentationml/2006/main">
   <p:cSld>
+    <p:bg>
+      <p:bgPr>
+        <a:solidFill>
+          <a:schemeClr val="tx1"/>
+        </a:solidFill>
+        <a:effectLst/>
+      </p:bgPr>
+    </p:bg>
     <p:spTree>
       <p:nvGrpSpPr>
         <p:cNvPr id="1" name=""/>
@@ -3352,6 +3360,7 @@
             <a:schemeClr val="accent5">
               <a:lumMod val="20000"/>
               <a:lumOff val="80000"/>
+              <a:alpha val="80000"/>
             </a:schemeClr>
           </a:solidFill>
           <a:ln>
@@ -3413,6 +3422,7 @@
             <a:schemeClr val="accent5">
               <a:lumMod val="20000"/>
               <a:lumOff val="80000"/>
+              <a:alpha val="80000"/>
             </a:schemeClr>
           </a:solidFill>
           <a:ln>
@@ -4178,14 +4188,26 @@
           <a:p>
             <a:pPr algn="ctr"/>
             <a:r>
-              <a:rPr lang="en-US" altLang="zh-CN" sz="1400" b="1" dirty="0"/>
+              <a:rPr lang="en-US" altLang="zh-CN" sz="1400" b="1" dirty="0">
+                <a:solidFill>
+                  <a:schemeClr val="bg1"/>
+                </a:solidFill>
+              </a:rPr>
               <a:t>IPC</a:t>
             </a:r>
             <a:r>
-              <a:rPr lang="zh-CN" altLang="en-US" sz="1400" b="1" dirty="0"/>
+              <a:rPr lang="zh-CN" altLang="en-US" sz="1400" b="1" dirty="0">
+                <a:solidFill>
+                  <a:schemeClr val="bg1"/>
+                </a:solidFill>
+              </a:rPr>
               <a:t>通信</a:t>
             </a:r>
-            <a:endParaRPr lang="zh-CN" altLang="en-US" sz="1200" dirty="0"/>
+            <a:endParaRPr lang="zh-CN" altLang="en-US" sz="1200" dirty="0">
+              <a:solidFill>
+                <a:schemeClr val="bg1"/>
+              </a:solidFill>
+            </a:endParaRPr>
           </a:p>
         </p:txBody>
       </p:sp>
@@ -4215,6 +4237,7 @@
             <a:schemeClr val="accent5">
               <a:lumMod val="20000"/>
               <a:lumOff val="80000"/>
+              <a:alpha val="80000"/>
             </a:schemeClr>
           </a:solidFill>
           <a:ln>
@@ -4309,8 +4332,8 @@
         </p:nvSpPr>
         <p:spPr>
           <a:xfrm>
-            <a:off x="6773390" y="3247553"/>
-            <a:ext cx="800219" cy="1015663"/>
+            <a:off x="6755758" y="3247553"/>
+            <a:ext cx="835485" cy="1015663"/>
           </a:xfrm>
           <a:prstGeom prst="rect">
             <a:avLst/>
@@ -4342,15 +4365,7 @@
             <a:pPr algn="ctr"/>
             <a:r>
               <a:rPr lang="en-US" altLang="zh-CN" sz="1200" b="1" dirty="0"/>
-              <a:t>(</a:t>
-            </a:r>
-            <a:r>
-              <a:rPr lang="zh-CN" altLang="en-US" sz="1200" b="1" dirty="0"/>
-              <a:t>可替换</a:t>
-            </a:r>
-            <a:r>
-              <a:rPr lang="en-US" altLang="zh-CN" sz="1200" b="1" dirty="0"/>
-              <a:t>)</a:t>
+              <a:t>(Gummy)</a:t>
             </a:r>
             <a:endParaRPr lang="zh-CN" altLang="en-US" sz="1200" dirty="0"/>
           </a:p>
@@ -4490,7 +4505,11 @@
           <a:p>
             <a:pPr algn="ctr"/>
             <a:r>
-              <a:rPr lang="zh-CN" altLang="en-US" sz="1400" b="1" dirty="0"/>
+              <a:rPr lang="zh-CN" altLang="en-US" sz="1400" b="1" dirty="0">
+                <a:solidFill>
+                  <a:schemeClr val="bg1"/>
+                </a:solidFill>
+              </a:rPr>
               <a:t>调用</a:t>
             </a:r>
           </a:p>
@@ -4777,6 +4796,7 @@
             <a:schemeClr val="accent5">
               <a:lumMod val="20000"/>
               <a:lumOff val="80000"/>
+              <a:alpha val="80000"/>
             </a:schemeClr>
           </a:solidFill>
           <a:ln>
@@ -5092,7 +5112,11 @@
           <a:p>
             <a:pPr algn="ctr"/>
             <a:r>
-              <a:rPr lang="zh-CN" altLang="en-US" sz="1400" b="1" dirty="0"/>
+              <a:rPr lang="zh-CN" altLang="en-US" sz="1400" b="1" dirty="0">
+                <a:solidFill>
+                  <a:schemeClr val="bg1"/>
+                </a:solidFill>
+              </a:rPr>
               <a:t>集成</a:t>
             </a:r>
           </a:p>
@@ -5169,7 +5193,11 @@
           <a:p>
             <a:pPr algn="ctr"/>
             <a:r>
-              <a:rPr lang="zh-CN" altLang="en-US" sz="1400" b="1" dirty="0"/>
+              <a:rPr lang="zh-CN" altLang="en-US" sz="1400" b="1" dirty="0">
+                <a:solidFill>
+                  <a:schemeClr val="bg1"/>
+                </a:solidFill>
+              </a:rPr>
               <a:t>集成</a:t>
             </a:r>
           </a:p>
@@ -5250,7 +5278,11 @@
           <a:p>
             <a:pPr algn="ctr"/>
             <a:r>
-              <a:rPr lang="zh-CN" altLang="en-US" sz="1400" b="1" dirty="0"/>
+              <a:rPr lang="zh-CN" altLang="en-US" sz="1400" b="1" dirty="0">
+                <a:solidFill>
+                  <a:schemeClr val="bg1"/>
+                </a:solidFill>
+              </a:rPr>
               <a:t>集成</a:t>
             </a:r>
           </a:p>
@@ -5416,6 +5448,14 @@
 <file path=ppt/slides/slide2.xml><?xml version="1.0" encoding="utf-8"?>
 <p:sld xmlns:a="http://schemas.openxmlformats.org/drawingml/2006/main" xmlns:r="http://schemas.openxmlformats.org/officeDocument/2006/relationships" xmlns:p="http://schemas.openxmlformats.org/presentationml/2006/main">
   <p:cSld>
+    <p:bg>
+      <p:bgPr>
+        <a:solidFill>
+          <a:schemeClr val="tx1"/>
+        </a:solidFill>
+        <a:effectLst/>
+      </p:bgPr>
+    </p:bg>
     <p:spTree>
       <p:nvGrpSpPr>
         <p:cNvPr id="1" name="">
@@ -5460,6 +5500,7 @@
             <a:schemeClr val="accent5">
               <a:lumMod val="20000"/>
               <a:lumOff val="80000"/>
+              <a:alpha val="80000"/>
             </a:schemeClr>
           </a:solidFill>
           <a:ln>
@@ -5521,6 +5562,7 @@
             <a:schemeClr val="accent5">
               <a:lumMod val="20000"/>
               <a:lumOff val="80000"/>
+              <a:alpha val="80000"/>
             </a:schemeClr>
           </a:solidFill>
           <a:ln>
@@ -6294,10 +6336,18 @@
           <a:p>
             <a:pPr algn="ctr"/>
             <a:r>
-              <a:rPr lang="en-US" altLang="zh-CN" sz="1400" b="1" dirty="0"/>
+              <a:rPr lang="en-US" altLang="zh-CN" sz="1400" b="1" dirty="0">
+                <a:solidFill>
+                  <a:schemeClr val="bg1"/>
+                </a:solidFill>
+              </a:rPr>
               <a:t>IPC Communication</a:t>
             </a:r>
-            <a:endParaRPr lang="zh-CN" altLang="en-US" sz="1200" b="1" dirty="0"/>
+            <a:endParaRPr lang="zh-CN" altLang="en-US" sz="1200" b="1" dirty="0">
+              <a:solidFill>
+                <a:schemeClr val="bg1"/>
+              </a:solidFill>
+            </a:endParaRPr>
           </a:p>
         </p:txBody>
       </p:sp>
@@ -6327,6 +6377,7 @@
             <a:schemeClr val="accent5">
               <a:lumMod val="20000"/>
               <a:lumOff val="80000"/>
+              <a:alpha val="80000"/>
             </a:schemeClr>
           </a:solidFill>
           <a:ln>
@@ -6443,7 +6494,7 @@
             </a:r>
             <a:r>
               <a:rPr lang="en-US" altLang="zh-CN" sz="900" b="1" dirty="0"/>
-              <a:t>(Replaceable)</a:t>
+              <a:t>(Gummy)</a:t>
             </a:r>
             <a:endParaRPr lang="zh-CN" altLang="en-US" sz="900" b="1" dirty="0"/>
           </a:p>
@@ -6584,10 +6635,18 @@
           <a:p>
             <a:pPr algn="ctr"/>
             <a:r>
-              <a:rPr lang="en-US" altLang="zh-CN" sz="1400" b="1" dirty="0"/>
+              <a:rPr lang="en-US" altLang="zh-CN" sz="1400" b="1" dirty="0">
+                <a:solidFill>
+                  <a:schemeClr val="bg1"/>
+                </a:solidFill>
+              </a:rPr>
               <a:t>Call</a:t>
             </a:r>
-            <a:endParaRPr lang="zh-CN" altLang="en-US" sz="1400" b="1" dirty="0"/>
+            <a:endParaRPr lang="zh-CN" altLang="en-US" sz="1400" b="1" dirty="0">
+              <a:solidFill>
+                <a:schemeClr val="bg1"/>
+              </a:solidFill>
+            </a:endParaRPr>
           </a:p>
         </p:txBody>
       </p:sp>
@@ -6861,6 +6920,7 @@
             <a:schemeClr val="accent5">
               <a:lumMod val="20000"/>
               <a:lumOff val="80000"/>
+              <a:alpha val="80000"/>
             </a:schemeClr>
           </a:solidFill>
           <a:ln>
@@ -7177,42 +7237,6 @@
           </a:fontRef>
         </p:style>
       </p:cxnSp>
-      <p:sp>
-        <p:nvSpPr>
-          <p:cNvPr id="49" name="文本框 48">
-            <a:extLst>
-              <a:ext uri="{FF2B5EF4-FFF2-40B4-BE49-F238E27FC236}">
-                <a16:creationId xmlns:a16="http://schemas.microsoft.com/office/drawing/2014/main" id="{012CE707-1133-6E71-5A17-7F503F027770}"/>
-              </a:ext>
-            </a:extLst>
-          </p:cNvPr>
-          <p:cNvSpPr txBox="1"/>
-          <p:nvPr/>
-        </p:nvSpPr>
-        <p:spPr>
-          <a:xfrm>
-            <a:off x="3261917" y="4252711"/>
-            <a:ext cx="543739" cy="307777"/>
-          </a:xfrm>
-          <a:prstGeom prst="rect">
-            <a:avLst/>
-          </a:prstGeom>
-          <a:noFill/>
-        </p:spPr>
-        <p:txBody>
-          <a:bodyPr wrap="none" rtlCol="0">
-            <a:spAutoFit/>
-          </a:bodyPr>
-          <a:lstStyle/>
-          <a:p>
-            <a:pPr algn="ctr"/>
-            <a:r>
-              <a:rPr lang="zh-CN" altLang="en-US" sz="1400" b="1" dirty="0"/>
-              <a:t>集成</a:t>
-            </a:r>
-          </a:p>
-        </p:txBody>
-      </p:sp>
       <p:cxnSp>
         <p:nvCxnSpPr>
           <p:cNvPr id="50" name="连接符: 肘形 49">
@@ -7272,7 +7296,7 @@
         </p:nvSpPr>
         <p:spPr>
           <a:xfrm>
-            <a:off x="630112" y="3226781"/>
+            <a:off x="673777" y="3226781"/>
             <a:ext cx="801823" cy="230832"/>
           </a:xfrm>
           <a:prstGeom prst="rect">
@@ -7288,10 +7312,18 @@
           <a:p>
             <a:pPr algn="ctr"/>
             <a:r>
-              <a:rPr lang="en-US" altLang="zh-CN" sz="900" b="1" dirty="0"/>
+              <a:rPr lang="en-US" altLang="zh-CN" sz="900" b="1" dirty="0">
+                <a:solidFill>
+                  <a:schemeClr val="bg1"/>
+                </a:solidFill>
+              </a:rPr>
               <a:t>Integration </a:t>
             </a:r>
-            <a:endParaRPr lang="zh-CN" altLang="en-US" sz="900" b="1" dirty="0"/>
+            <a:endParaRPr lang="zh-CN" altLang="en-US" sz="900" b="1" dirty="0">
+              <a:solidFill>
+                <a:schemeClr val="bg1"/>
+              </a:solidFill>
+            </a:endParaRPr>
           </a:p>
         </p:txBody>
       </p:sp>
@@ -7466,10 +7498,63 @@
           <a:p>
             <a:pPr algn="ctr"/>
             <a:r>
-              <a:rPr lang="en-US" altLang="zh-CN" sz="900" b="1" dirty="0"/>
+              <a:rPr lang="en-US" altLang="zh-CN" sz="900" b="1" dirty="0">
+                <a:solidFill>
+                  <a:schemeClr val="bg1"/>
+                </a:solidFill>
+              </a:rPr>
               <a:t>Integration </a:t>
             </a:r>
-            <a:endParaRPr lang="zh-CN" altLang="en-US" sz="900" b="1" dirty="0"/>
+            <a:endParaRPr lang="zh-CN" altLang="en-US" sz="900" b="1" dirty="0">
+              <a:solidFill>
+                <a:schemeClr val="bg1"/>
+              </a:solidFill>
+            </a:endParaRPr>
+          </a:p>
+        </p:txBody>
+      </p:sp>
+      <p:sp>
+        <p:nvSpPr>
+          <p:cNvPr id="6" name="文本框 5">
+            <a:extLst>
+              <a:ext uri="{FF2B5EF4-FFF2-40B4-BE49-F238E27FC236}">
+                <a16:creationId xmlns:a16="http://schemas.microsoft.com/office/drawing/2014/main" id="{CC0614EC-D9A0-1FE3-779C-1E0A3765666C}"/>
+              </a:ext>
+            </a:extLst>
+          </p:cNvPr>
+          <p:cNvSpPr txBox="1"/>
+          <p:nvPr/>
+        </p:nvSpPr>
+        <p:spPr>
+          <a:xfrm>
+            <a:off x="3343297" y="4285203"/>
+            <a:ext cx="801823" cy="230832"/>
+          </a:xfrm>
+          <a:prstGeom prst="rect">
+            <a:avLst/>
+          </a:prstGeom>
+          <a:noFill/>
+        </p:spPr>
+        <p:txBody>
+          <a:bodyPr wrap="none" rtlCol="0">
+            <a:spAutoFit/>
+          </a:bodyPr>
+          <a:lstStyle/>
+          <a:p>
+            <a:pPr algn="ctr"/>
+            <a:r>
+              <a:rPr lang="en-US" altLang="zh-CN" sz="900" b="1" dirty="0">
+                <a:solidFill>
+                  <a:schemeClr val="bg1"/>
+                </a:solidFill>
+              </a:rPr>
+              <a:t>Integration </a:t>
+            </a:r>
+            <a:endParaRPr lang="zh-CN" altLang="en-US" sz="900" b="1" dirty="0">
+              <a:solidFill>
+                <a:schemeClr val="bg1"/>
+              </a:solidFill>
+            </a:endParaRPr>
           </a:p>
         </p:txBody>
       </p:sp>
@@ -7489,6 +7574,14 @@
 <file path=ppt/slides/slide3.xml><?xml version="1.0" encoding="utf-8"?>
 <p:sld xmlns:a="http://schemas.openxmlformats.org/drawingml/2006/main" xmlns:r="http://schemas.openxmlformats.org/officeDocument/2006/relationships" xmlns:p="http://schemas.openxmlformats.org/presentationml/2006/main">
   <p:cSld>
+    <p:bg>
+      <p:bgPr>
+        <a:solidFill>
+          <a:schemeClr val="tx1"/>
+        </a:solidFill>
+        <a:effectLst/>
+      </p:bgPr>
+    </p:bg>
     <p:spTree>
       <p:nvGrpSpPr>
         <p:cNvPr id="1" name="">
@@ -7533,6 +7626,7 @@
             <a:schemeClr val="accent5">
               <a:lumMod val="20000"/>
               <a:lumOff val="80000"/>
+              <a:alpha val="80000"/>
             </a:schemeClr>
           </a:solidFill>
           <a:ln>
@@ -7594,6 +7688,7 @@
             <a:schemeClr val="accent5">
               <a:lumMod val="20000"/>
               <a:lumOff val="80000"/>
+              <a:alpha val="80000"/>
             </a:schemeClr>
           </a:solidFill>
           <a:ln>
@@ -8469,6 +8564,9 @@
             <a:pPr algn="ctr"/>
             <a:r>
               <a:rPr lang="en-US" altLang="zh-CN" sz="1400" b="1" dirty="0">
+                <a:solidFill>
+                  <a:schemeClr val="bg1"/>
+                </a:solidFill>
                 <a:latin typeface="Yu Gothic" panose="020B0400000000000000" pitchFamily="34" charset="-128"/>
                 <a:ea typeface="Yu Gothic" panose="020B0400000000000000" pitchFamily="34" charset="-128"/>
               </a:rPr>
@@ -8476,12 +8574,18 @@
             </a:r>
             <a:r>
               <a:rPr lang="zh-CN" altLang="en-US" sz="1400" b="1" dirty="0">
+                <a:solidFill>
+                  <a:schemeClr val="bg1"/>
+                </a:solidFill>
                 <a:latin typeface="Yu Gothic" panose="020B0400000000000000" pitchFamily="34" charset="-128"/>
                 <a:ea typeface="Yu Gothic" panose="020B0400000000000000" pitchFamily="34" charset="-128"/>
               </a:rPr>
               <a:t>通信</a:t>
             </a:r>
             <a:endParaRPr lang="zh-CN" altLang="en-US" sz="1200" b="1" dirty="0">
+              <a:solidFill>
+                <a:schemeClr val="bg1"/>
+              </a:solidFill>
               <a:latin typeface="Yu Gothic" panose="020B0400000000000000" pitchFamily="34" charset="-128"/>
               <a:ea typeface="Yu Gothic" panose="020B0400000000000000" pitchFamily="34" charset="-128"/>
             </a:endParaRPr>
@@ -8514,6 +8618,7 @@
             <a:schemeClr val="accent5">
               <a:lumMod val="20000"/>
               <a:lumOff val="80000"/>
+              <a:alpha val="80000"/>
             </a:schemeClr>
           </a:solidFill>
           <a:ln>
@@ -8638,7 +8743,15 @@
             </a:r>
             <a:r>
               <a:rPr lang="ja-JP" altLang="en-US" sz="1000" b="1" dirty="0"/>
-              <a:t>（交換可能）</a:t>
+              <a:t>（</a:t>
+            </a:r>
+            <a:r>
+              <a:rPr lang="en-US" altLang="ja-JP" sz="1000" b="1" dirty="0"/>
+              <a:t>Gummy</a:t>
+            </a:r>
+            <a:r>
+              <a:rPr lang="ja-JP" altLang="en-US" sz="1000" b="1" dirty="0"/>
+              <a:t>）</a:t>
             </a:r>
             <a:endParaRPr lang="zh-CN" altLang="en-US" sz="1000" b="1" dirty="0"/>
           </a:p>
@@ -8780,6 +8893,9 @@
             <a:pPr algn="ctr"/>
             <a:r>
               <a:rPr lang="zh-CN" altLang="en-US" sz="1100" b="1" dirty="0">
+                <a:solidFill>
+                  <a:schemeClr val="bg1"/>
+                </a:solidFill>
                 <a:latin typeface="Yu Gothic" panose="020B0400000000000000" pitchFamily="34" charset="-128"/>
                 <a:ea typeface="Yu Gothic" panose="020B0400000000000000" pitchFamily="34" charset="-128"/>
               </a:rPr>
@@ -8787,6 +8903,9 @@
             </a:r>
             <a:r>
               <a:rPr lang="ja-JP" altLang="en-US" sz="1100" b="1" dirty="0">
+                <a:solidFill>
+                  <a:schemeClr val="bg1"/>
+                </a:solidFill>
                 <a:latin typeface="Yu Gothic" panose="020B0400000000000000" pitchFamily="34" charset="-128"/>
                 <a:ea typeface="Yu Gothic" panose="020B0400000000000000" pitchFamily="34" charset="-128"/>
               </a:rPr>
@@ -8794,6 +8913,9 @@
             </a:r>
             <a:r>
               <a:rPr lang="zh-CN" altLang="en-US" sz="1100" b="1" dirty="0">
+                <a:solidFill>
+                  <a:schemeClr val="bg1"/>
+                </a:solidFill>
                 <a:latin typeface="Yu Gothic" panose="020B0400000000000000" pitchFamily="34" charset="-128"/>
                 <a:ea typeface="Yu Gothic" panose="020B0400000000000000" pitchFamily="34" charset="-128"/>
               </a:rPr>
@@ -8801,12 +8923,18 @@
             </a:r>
             <a:r>
               <a:rPr lang="ja-JP" altLang="en-US" sz="1100" b="1" dirty="0">
+                <a:solidFill>
+                  <a:schemeClr val="bg1"/>
+                </a:solidFill>
                 <a:latin typeface="Yu Gothic" panose="020B0400000000000000" pitchFamily="34" charset="-128"/>
                 <a:ea typeface="Yu Gothic" panose="020B0400000000000000" pitchFamily="34" charset="-128"/>
               </a:rPr>
               <a:t>し</a:t>
             </a:r>
             <a:endParaRPr lang="zh-CN" altLang="en-US" sz="1100" b="1" dirty="0">
+              <a:solidFill>
+                <a:schemeClr val="bg1"/>
+              </a:solidFill>
               <a:latin typeface="Yu Gothic" panose="020B0400000000000000" pitchFamily="34" charset="-128"/>
               <a:ea typeface="Yu Gothic" panose="020B0400000000000000" pitchFamily="34" charset="-128"/>
             </a:endParaRPr>
@@ -9130,6 +9258,7 @@
             <a:schemeClr val="accent5">
               <a:lumMod val="20000"/>
               <a:lumOff val="80000"/>
+              <a:alpha val="80000"/>
             </a:schemeClr>
           </a:solidFill>
           <a:ln>
@@ -9443,6 +9572,9 @@
             <a:pPr algn="ctr"/>
             <a:r>
               <a:rPr lang="zh-CN" altLang="en-US" sz="1400" b="1" dirty="0">
+                <a:solidFill>
+                  <a:schemeClr val="bg1"/>
+                </a:solidFill>
                 <a:latin typeface="Yu Gothic" panose="020B0400000000000000" pitchFamily="34" charset="-128"/>
                 <a:ea typeface="Yu Gothic" panose="020B0400000000000000" pitchFamily="34" charset="-128"/>
               </a:rPr>
@@ -9568,6 +9700,9 @@
             <a:pPr algn="ctr"/>
             <a:r>
               <a:rPr lang="zh-CN" altLang="en-US" sz="1400" b="1" dirty="0">
+                <a:solidFill>
+                  <a:schemeClr val="bg1"/>
+                </a:solidFill>
                 <a:latin typeface="Yu Gothic" panose="020B0400000000000000" pitchFamily="34" charset="-128"/>
                 <a:ea typeface="Yu Gothic" panose="020B0400000000000000" pitchFamily="34" charset="-128"/>
               </a:rPr>
@@ -9760,6 +9895,9 @@
             <a:pPr algn="ctr"/>
             <a:r>
               <a:rPr lang="zh-CN" altLang="en-US" sz="1400" b="1" dirty="0">
+                <a:solidFill>
+                  <a:schemeClr val="bg1"/>
+                </a:solidFill>
                 <a:latin typeface="Yu Gothic" panose="020B0400000000000000" pitchFamily="34" charset="-128"/>
                 <a:ea typeface="Yu Gothic" panose="020B0400000000000000" pitchFamily="34" charset="-128"/>
               </a:rPr>

</xml_diff>